<commit_message>
add more options for zadd in redis_zset
</commit_message>
<xml_diff>
--- a/doc/acl_fiber.pptx
+++ b/doc/acl_fiber.pptx
@@ -3283,7 +3283,7 @@
             <a:fld id="{22280FE6-A104-468D-880C-8FA3CB8840D3}" type="datetimeFigureOut">
               <a:rPr lang="zh-CN" altLang="en-US" smtClean="0"/>
               <a:pPr/>
-              <a:t>2020/5/24</a:t>
+              <a:t>2020/6/4</a:t>
             </a:fld>
             <a:endParaRPr lang="zh-CN" altLang="en-US"/>
           </a:p>
@@ -3955,7 +3955,7 @@
               <a:pPr>
                 <a:defRPr/>
               </a:pPr>
-              <a:t>2020/5/24</a:t>
+              <a:t>2020/6/4</a:t>
             </a:fld>
             <a:endParaRPr lang="zh-CN" altLang="en-US" sz="1200" dirty="0">
               <a:solidFill>
@@ -4037,7 +4037,7 @@
             <a:fld id="{8C5BEB32-F9B7-4A26-A503-E0A0BBE82DBD}" type="datetimeFigureOut">
               <a:rPr lang="zh-CN" altLang="en-US" smtClean="0"/>
               <a:pPr/>
-              <a:t>2020/5/24</a:t>
+              <a:t>2020/6/4</a:t>
             </a:fld>
             <a:endParaRPr lang="zh-CN" altLang="en-US"/>
           </a:p>
@@ -4127,7 +4127,7 @@
                 <a:tabLst/>
                 <a:defRPr/>
               </a:pPr>
-              <a:t>2020/5/24</a:t>
+              <a:t>2020/6/4</a:t>
             </a:fld>
             <a:endParaRPr kumimoji="0" lang="zh-CN" altLang="en-US" sz="1200" b="0" i="0" u="none" strike="noStrike" kern="1200" cap="none" spc="0" normalizeH="0" baseline="0" noProof="0" dirty="0">
               <a:ln>
@@ -4451,7 +4451,7 @@
                 <a:tabLst/>
                 <a:defRPr/>
               </a:pPr>
-              <a:t>2020/5/24</a:t>
+              <a:t>2020/6/4</a:t>
             </a:fld>
             <a:endParaRPr kumimoji="0" lang="zh-CN" altLang="en-US" sz="1200" b="0" i="0" u="none" strike="noStrike" kern="1200" cap="none" spc="0" normalizeH="0" baseline="0" noProof="0" dirty="0">
               <a:ln>
@@ -5020,7 +5020,7 @@
                 <a:tabLst/>
                 <a:defRPr/>
               </a:pPr>
-              <a:t>2020/5/24</a:t>
+              <a:t>2020/6/4</a:t>
             </a:fld>
             <a:endParaRPr kumimoji="0" lang="zh-CN" altLang="en-US" sz="1200" b="0" i="0" u="none" strike="noStrike" kern="1200" cap="none" spc="0" normalizeH="0" baseline="0" noProof="0" dirty="0">
               <a:ln>
@@ -5572,7 +5572,7 @@
                 <a:tabLst/>
                 <a:defRPr/>
               </a:pPr>
-              <a:t>2020/5/24</a:t>
+              <a:t>2020/6/4</a:t>
             </a:fld>
             <a:endParaRPr kumimoji="0" lang="zh-CN" altLang="en-US" sz="1200" b="0" i="0" u="none" strike="noStrike" kern="1200" cap="none" spc="0" normalizeH="0" baseline="0" noProof="0" dirty="0">
               <a:ln>
@@ -5838,7 +5838,7 @@
             <a:fld id="{8C5BEB32-F9B7-4A26-A503-E0A0BBE82DBD}" type="datetimeFigureOut">
               <a:rPr lang="zh-CN" altLang="en-US" smtClean="0"/>
               <a:pPr/>
-              <a:t>2020/5/24</a:t>
+              <a:t>2020/6/4</a:t>
             </a:fld>
             <a:endParaRPr lang="zh-CN" altLang="en-US"/>
           </a:p>
@@ -6078,7 +6078,7 @@
                 <a:tabLst/>
                 <a:defRPr/>
               </a:pPr>
-              <a:t>2020/5/24</a:t>
+              <a:t>2020/6/4</a:t>
             </a:fld>
             <a:endParaRPr kumimoji="0" lang="zh-CN" altLang="en-US" sz="1200" b="0" i="0" u="none" strike="noStrike" kern="1200" cap="none" spc="0" normalizeH="0" baseline="0" noProof="0" dirty="0">
               <a:ln>
@@ -6264,7 +6264,7 @@
             <a:fld id="{8C5BEB32-F9B7-4A26-A503-E0A0BBE82DBD}" type="datetimeFigureOut">
               <a:rPr lang="zh-CN" altLang="en-US" smtClean="0"/>
               <a:pPr/>
-              <a:t>2020/5/24</a:t>
+              <a:t>2020/6/4</a:t>
             </a:fld>
             <a:endParaRPr lang="zh-CN" altLang="en-US"/>
           </a:p>
@@ -6504,7 +6504,7 @@
                 <a:tabLst/>
                 <a:defRPr/>
               </a:pPr>
-              <a:t>2020/5/24</a:t>
+              <a:t>2020/6/4</a:t>
             </a:fld>
             <a:endParaRPr kumimoji="0" lang="zh-CN" altLang="en-US" sz="1200" b="0" i="0" u="none" strike="noStrike" kern="1200" cap="none" spc="0" normalizeH="0" baseline="0" noProof="0" dirty="0">
               <a:ln>
@@ -6666,7 +6666,7 @@
             <a:fld id="{8C5BEB32-F9B7-4A26-A503-E0A0BBE82DBD}" type="datetimeFigureOut">
               <a:rPr lang="zh-CN" altLang="en-US" smtClean="0"/>
               <a:pPr/>
-              <a:t>2020/5/24</a:t>
+              <a:t>2020/6/4</a:t>
             </a:fld>
             <a:endParaRPr lang="zh-CN" altLang="en-US"/>
           </a:p>
@@ -7007,7 +7007,7 @@
                 <a:tabLst/>
                 <a:defRPr/>
               </a:pPr>
-              <a:t>2020/5/24</a:t>
+              <a:t>2020/6/4</a:t>
             </a:fld>
             <a:endParaRPr kumimoji="0" lang="zh-CN" altLang="en-US" sz="1200" b="0" i="0" u="none" strike="noStrike" kern="1200" cap="none" spc="0" normalizeH="0" baseline="0" noProof="0" dirty="0">
               <a:ln>
@@ -7169,7 +7169,7 @@
             <a:fld id="{8C5BEB32-F9B7-4A26-A503-E0A0BBE82DBD}" type="datetimeFigureOut">
               <a:rPr lang="zh-CN" altLang="en-US" smtClean="0"/>
               <a:pPr/>
-              <a:t>2020/5/24</a:t>
+              <a:t>2020/6/4</a:t>
             </a:fld>
             <a:endParaRPr lang="zh-CN" altLang="en-US"/>
           </a:p>
@@ -7397,7 +7397,7 @@
                 <a:tabLst/>
                 <a:defRPr/>
               </a:pPr>
-              <a:t>2020/5/24</a:t>
+              <a:t>2020/6/4</a:t>
             </a:fld>
             <a:endParaRPr kumimoji="0" lang="zh-CN" altLang="en-US" sz="1200" b="0" i="0" u="none" strike="noStrike" kern="1200" cap="none" spc="0" normalizeH="0" baseline="0" noProof="0" dirty="0">
               <a:ln>
@@ -7700,7 +7700,7 @@
             <a:fld id="{8C5BEB32-F9B7-4A26-A503-E0A0BBE82DBD}" type="datetimeFigureOut">
               <a:rPr lang="zh-CN" altLang="en-US" smtClean="0"/>
               <a:pPr/>
-              <a:t>2020/5/24</a:t>
+              <a:t>2020/6/4</a:t>
             </a:fld>
             <a:endParaRPr lang="zh-CN" altLang="en-US"/>
           </a:p>
@@ -8305,7 +8305,7 @@
               <a:pPr>
                 <a:defRPr/>
               </a:pPr>
-              <a:t>2020/5/24</a:t>
+              <a:t>2020/6/4</a:t>
             </a:fld>
             <a:endParaRPr lang="zh-CN" altLang="en-US" sz="1200" dirty="0">
               <a:solidFill>
@@ -9169,7 +9169,19 @@
           <a:p>
             <a:pPr algn="ctr"/>
             <a:r>
-              <a:rPr kumimoji="1" lang="zh-CN" altLang="en-US" sz="1100" dirty="0"/>
+              <a:rPr kumimoji="1" lang="zh-CN" altLang="en-US" sz="1100" dirty="0">
+                <a:ln w="0"/>
+                <a:solidFill>
+                  <a:schemeClr val="bg1"/>
+                </a:solidFill>
+                <a:effectLst>
+                  <a:outerShdw blurRad="38100" dist="25400" dir="5400000" algn="ctr" rotWithShape="0">
+                    <a:srgbClr val="6E747A">
+                      <a:alpha val="43000"/>
+                    </a:srgbClr>
+                  </a:outerShdw>
+                </a:effectLst>
+              </a:rPr>
               <a:t>准备就绪</a:t>
             </a:r>
           </a:p>
@@ -9224,7 +9236,19 @@
           <a:p>
             <a:pPr algn="ctr"/>
             <a:r>
-              <a:rPr kumimoji="1" lang="zh-CN" altLang="en-US" sz="1100" dirty="0"/>
+              <a:rPr kumimoji="1" lang="zh-CN" altLang="en-US" sz="1100" dirty="0">
+                <a:ln w="0"/>
+                <a:solidFill>
+                  <a:schemeClr val="bg1"/>
+                </a:solidFill>
+                <a:effectLst>
+                  <a:outerShdw blurRad="38100" dist="25400" dir="5400000" algn="ctr" rotWithShape="0">
+                    <a:srgbClr val="6E747A">
+                      <a:alpha val="43000"/>
+                    </a:srgbClr>
+                  </a:outerShdw>
+                </a:effectLst>
+              </a:rPr>
               <a:t>协程创建</a:t>
             </a:r>
           </a:p>
@@ -9279,7 +9303,19 @@
           <a:p>
             <a:pPr algn="ctr"/>
             <a:r>
-              <a:rPr kumimoji="1" lang="zh-CN" altLang="en-US" sz="1100" dirty="0"/>
+              <a:rPr kumimoji="1" lang="zh-CN" altLang="en-US" sz="1100" dirty="0">
+                <a:ln w="0"/>
+                <a:solidFill>
+                  <a:schemeClr val="bg1"/>
+                </a:solidFill>
+                <a:effectLst>
+                  <a:outerShdw blurRad="38100" dist="25400" dir="5400000" algn="ctr" rotWithShape="0">
+                    <a:srgbClr val="6E747A">
+                      <a:alpha val="43000"/>
+                    </a:srgbClr>
+                  </a:outerShdw>
+                </a:effectLst>
+              </a:rPr>
               <a:t>协程运行</a:t>
             </a:r>
           </a:p>
@@ -9426,7 +9462,19 @@
           <a:p>
             <a:pPr algn="ctr"/>
             <a:r>
-              <a:rPr kumimoji="1" lang="zh-CN" altLang="en-US" sz="1100" dirty="0"/>
+              <a:rPr kumimoji="1" lang="zh-CN" altLang="en-US" sz="1100" dirty="0">
+                <a:ln w="0"/>
+                <a:solidFill>
+                  <a:schemeClr val="bg1"/>
+                </a:solidFill>
+                <a:effectLst>
+                  <a:outerShdw blurRad="38100" dist="25400" dir="5400000" algn="ctr" rotWithShape="0">
+                    <a:srgbClr val="6E747A">
+                      <a:alpha val="43000"/>
+                    </a:srgbClr>
+                  </a:outerShdw>
+                </a:effectLst>
+              </a:rPr>
               <a:t>协程挂起</a:t>
             </a:r>
           </a:p>
@@ -9481,7 +9529,19 @@
           <a:p>
             <a:pPr algn="ctr"/>
             <a:r>
-              <a:rPr kumimoji="1" lang="zh-CN" altLang="en-US" sz="1100" dirty="0"/>
+              <a:rPr kumimoji="1" lang="zh-CN" altLang="en-US" sz="1100" dirty="0">
+                <a:ln w="0"/>
+                <a:solidFill>
+                  <a:schemeClr val="bg1"/>
+                </a:solidFill>
+                <a:effectLst>
+                  <a:outerShdw blurRad="38100" dist="25400" dir="5400000" algn="ctr" rotWithShape="0">
+                    <a:srgbClr val="6E747A">
+                      <a:alpha val="43000"/>
+                    </a:srgbClr>
+                  </a:outerShdw>
+                </a:effectLst>
+              </a:rPr>
               <a:t>协程退出</a:t>
             </a:r>
           </a:p>
@@ -9667,7 +9727,19 @@
           <a:lstStyle/>
           <a:p>
             <a:pPr algn="ctr"/>
-            <a:endParaRPr kumimoji="1" lang="zh-CN" altLang="en-US"/>
+            <a:endParaRPr kumimoji="1" lang="zh-CN" altLang="en-US">
+              <a:ln w="0"/>
+              <a:solidFill>
+                <a:schemeClr val="bg1"/>
+              </a:solidFill>
+              <a:effectLst>
+                <a:outerShdw blurRad="38100" dist="25400" dir="5400000" algn="ctr" rotWithShape="0">
+                  <a:srgbClr val="6E747A">
+                    <a:alpha val="43000"/>
+                  </a:srgbClr>
+                </a:outerShdw>
+              </a:effectLst>
+            </a:endParaRPr>
           </a:p>
         </p:txBody>
       </p:sp>

</xml_diff>